<commit_message>
Conclusão da Migração para hospedagem Plesk
</commit_message>
<xml_diff>
--- a/F14 - Cursos de TI/Documentos/Planos de Ensino/Conteúdo dos Cursos.pptx
+++ b/F14 - Cursos de TI/Documentos/Planos de Ensino/Conteúdo dos Cursos.pptx
@@ -15,6 +15,13 @@
     <p:sldId id="263" r:id="rId9"/>
     <p:sldId id="264" r:id="rId10"/>
     <p:sldId id="265" r:id="rId11"/>
+    <p:sldId id="266" r:id="rId12"/>
+    <p:sldId id="267" r:id="rId13"/>
+    <p:sldId id="268" r:id="rId14"/>
+    <p:sldId id="269" r:id="rId15"/>
+    <p:sldId id="270" r:id="rId16"/>
+    <p:sldId id="271" r:id="rId17"/>
+    <p:sldId id="272" r:id="rId18"/>
   </p:sldIdLst>
   <p:sldSz cx="12192000" cy="6858000"/>
   <p:notesSz cx="6858000" cy="9144000"/>
@@ -867,7 +874,7 @@
             <a:fld id="{B61BEF0D-F0BB-DE4B-95CE-6DB70DBA9567}" type="datetimeFigureOut">
               <a:rPr lang="en-US" smtClean="0"/>
               <a:pPr/>
-              <a:t>1/30/2015</a:t>
+              <a:t>3/15/2015</a:t>
             </a:fld>
             <a:endParaRPr lang="en-US" dirty="0"/>
           </a:p>
@@ -1120,7 +1127,7 @@
             <a:fld id="{B61BEF0D-F0BB-DE4B-95CE-6DB70DBA9567}" type="datetimeFigureOut">
               <a:rPr lang="en-US" smtClean="0"/>
               <a:pPr/>
-              <a:t>1/30/2015</a:t>
+              <a:t>3/15/2015</a:t>
             </a:fld>
             <a:endParaRPr lang="en-US" dirty="0"/>
           </a:p>
@@ -1436,7 +1443,7 @@
             <a:fld id="{B61BEF0D-F0BB-DE4B-95CE-6DB70DBA9567}" type="datetimeFigureOut">
               <a:rPr lang="en-US" smtClean="0"/>
               <a:pPr/>
-              <a:t>1/30/2015</a:t>
+              <a:t>3/15/2015</a:t>
             </a:fld>
             <a:endParaRPr lang="en-US" dirty="0"/>
           </a:p>
@@ -1771,7 +1778,7 @@
             <a:fld id="{B61BEF0D-F0BB-DE4B-95CE-6DB70DBA9567}" type="datetimeFigureOut">
               <a:rPr lang="en-US" smtClean="0"/>
               <a:pPr/>
-              <a:t>1/30/2015</a:t>
+              <a:t>3/15/2015</a:t>
             </a:fld>
             <a:endParaRPr lang="en-US" dirty="0"/>
           </a:p>
@@ -2087,7 +2094,7 @@
             <a:fld id="{B61BEF0D-F0BB-DE4B-95CE-6DB70DBA9567}" type="datetimeFigureOut">
               <a:rPr lang="en-US" smtClean="0"/>
               <a:pPr/>
-              <a:t>1/30/2015</a:t>
+              <a:t>3/15/2015</a:t>
             </a:fld>
             <a:endParaRPr lang="en-US" dirty="0"/>
           </a:p>
@@ -2482,7 +2489,7 @@
             <a:fld id="{B61BEF0D-F0BB-DE4B-95CE-6DB70DBA9567}" type="datetimeFigureOut">
               <a:rPr lang="en-US" smtClean="0"/>
               <a:pPr/>
-              <a:t>1/30/2015</a:t>
+              <a:t>3/15/2015</a:t>
             </a:fld>
             <a:endParaRPr lang="en-US" dirty="0"/>
           </a:p>
@@ -2653,7 +2660,7 @@
           <a:p>
             <a:fld id="{55C6B4A9-1611-4792-9094-5F34BCA07E0B}" type="datetimeFigureOut">
               <a:rPr lang="en-US" smtClean="0"/>
-              <a:t>1/30/2015</a:t>
+              <a:t>3/15/2015</a:t>
             </a:fld>
             <a:endParaRPr lang="en-US" dirty="0"/>
           </a:p>
@@ -2834,7 +2841,7 @@
             <a:fld id="{B61BEF0D-F0BB-DE4B-95CE-6DB70DBA9567}" type="datetimeFigureOut">
               <a:rPr lang="en-US" smtClean="0"/>
               <a:pPr/>
-              <a:t>1/30/2015</a:t>
+              <a:t>3/15/2015</a:t>
             </a:fld>
             <a:endParaRPr lang="en-US" dirty="0"/>
           </a:p>
@@ -3005,7 +3012,7 @@
           <a:p>
             <a:fld id="{42A54C80-263E-416B-A8E0-580EDEADCBDC}" type="datetimeFigureOut">
               <a:rPr lang="en-US" smtClean="0"/>
-              <a:t>1/30/2015</a:t>
+              <a:t>3/15/2015</a:t>
             </a:fld>
             <a:endParaRPr lang="en-US" dirty="0"/>
           </a:p>
@@ -3253,7 +3260,7 @@
             <a:fld id="{B61BEF0D-F0BB-DE4B-95CE-6DB70DBA9567}" type="datetimeFigureOut">
               <a:rPr lang="en-US" smtClean="0"/>
               <a:pPr/>
-              <a:t>1/30/2015</a:t>
+              <a:t>3/15/2015</a:t>
             </a:fld>
             <a:endParaRPr lang="en-US" dirty="0"/>
           </a:p>
@@ -3486,7 +3493,7 @@
           <a:p>
             <a:fld id="{42A54C80-263E-416B-A8E0-580EDEADCBDC}" type="datetimeFigureOut">
               <a:rPr lang="en-US" smtClean="0"/>
-              <a:t>1/30/2015</a:t>
+              <a:t>3/15/2015</a:t>
             </a:fld>
             <a:endParaRPr lang="en-US" dirty="0"/>
           </a:p>
@@ -3861,7 +3868,7 @@
             <a:fld id="{B61BEF0D-F0BB-DE4B-95CE-6DB70DBA9567}" type="datetimeFigureOut">
               <a:rPr lang="en-US" smtClean="0"/>
               <a:pPr/>
-              <a:t>1/30/2015</a:t>
+              <a:t>3/15/2015</a:t>
             </a:fld>
             <a:endParaRPr lang="en-US" dirty="0"/>
           </a:p>
@@ -3986,7 +3993,7 @@
             <a:fld id="{B61BEF0D-F0BB-DE4B-95CE-6DB70DBA9567}" type="datetimeFigureOut">
               <a:rPr lang="en-US" smtClean="0"/>
               <a:pPr/>
-              <a:t>1/30/2015</a:t>
+              <a:t>3/15/2015</a:t>
             </a:fld>
             <a:endParaRPr lang="en-US" dirty="0"/>
           </a:p>
@@ -4083,7 +4090,7 @@
             <a:fld id="{B61BEF0D-F0BB-DE4B-95CE-6DB70DBA9567}" type="datetimeFigureOut">
               <a:rPr lang="en-US" smtClean="0"/>
               <a:pPr/>
-              <a:t>1/30/2015</a:t>
+              <a:t>3/15/2015</a:t>
             </a:fld>
             <a:endParaRPr lang="en-US" dirty="0"/>
           </a:p>
@@ -4339,7 +4346,7 @@
           <a:p>
             <a:fld id="{42A54C80-263E-416B-A8E0-580EDEADCBDC}" type="datetimeFigureOut">
               <a:rPr lang="en-US" smtClean="0"/>
-              <a:t>1/30/2015</a:t>
+              <a:t>3/15/2015</a:t>
             </a:fld>
             <a:endParaRPr lang="en-US" dirty="0"/>
           </a:p>
@@ -4646,7 +4653,7 @@
             <a:fld id="{B61BEF0D-F0BB-DE4B-95CE-6DB70DBA9567}" type="datetimeFigureOut">
               <a:rPr lang="en-US" smtClean="0"/>
               <a:pPr/>
-              <a:t>1/30/2015</a:t>
+              <a:t>3/15/2015</a:t>
             </a:fld>
             <a:endParaRPr lang="en-US" dirty="0"/>
           </a:p>
@@ -5349,7 +5356,7 @@
             <a:fld id="{B61BEF0D-F0BB-DE4B-95CE-6DB70DBA9567}" type="datetimeFigureOut">
               <a:rPr lang="en-US" smtClean="0"/>
               <a:pPr/>
-              <a:t>1/30/2015</a:t>
+              <a:t>3/15/2015</a:t>
             </a:fld>
             <a:endParaRPr lang="en-US" dirty="0"/>
           </a:p>
@@ -5969,22 +5976,62 @@
         </p:nvSpPr>
         <p:spPr/>
         <p:txBody>
-          <a:bodyPr/>
-          <a:lstStyle/>
-          <a:p>
-            <a:r>
-              <a:rPr lang="pt-BR" smtClean="0">
-                <a:solidFill>
-                  <a:schemeClr val="accent6">
+          <a:bodyPr>
+            <a:normAutofit fontScale="90000"/>
+          </a:bodyPr>
+          <a:lstStyle/>
+          <a:p>
+            <a:r>
+              <a:rPr lang="pt-BR" u="sng" dirty="0" smtClean="0">
+                <a:solidFill>
+                  <a:schemeClr val="accent5">
                     <a:lumMod val="75000"/>
                   </a:schemeClr>
                 </a:solidFill>
               </a:rPr>
-              <a:t>Análise de Requisitos - Introdução</a:t>
-            </a:r>
-            <a:endParaRPr lang="pt-BR" dirty="0">
+              <a:t>Introdução</a:t>
+            </a:r>
+            <a:r>
+              <a:rPr lang="pt-BR" dirty="0" smtClean="0">
+                <a:solidFill>
+                  <a:schemeClr val="accent5">
+                    <a:lumMod val="75000"/>
+                  </a:schemeClr>
+                </a:solidFill>
+              </a:rPr>
+              <a:t/>
+            </a:r>
+            <a:br>
+              <a:rPr lang="pt-BR" dirty="0" smtClean="0">
+                <a:solidFill>
+                  <a:schemeClr val="accent5">
+                    <a:lumMod val="75000"/>
+                  </a:schemeClr>
+                </a:solidFill>
+              </a:rPr>
+            </a:br>
+            <a:r>
+              <a:rPr lang="pt-BR" dirty="0" smtClean="0">
+                <a:solidFill>
+                  <a:schemeClr val="accent5">
+                    <a:lumMod val="75000"/>
+                  </a:schemeClr>
+                </a:solidFill>
+              </a:rPr>
+              <a:t>(Teste de Software)</a:t>
+            </a:r>
+            <a:br>
+              <a:rPr lang="pt-BR" dirty="0" smtClean="0">
+                <a:solidFill>
+                  <a:schemeClr val="accent5">
+                    <a:lumMod val="75000"/>
+                  </a:schemeClr>
+                </a:solidFill>
+              </a:rPr>
+            </a:br>
+            <a:endParaRPr lang="pt-BR" u="sng" dirty="0">
               <a:solidFill>
-                <a:schemeClr val="accent6">
+                <a:schemeClr val="accent5">
                   <a:lumMod val="75000"/>
                 </a:schemeClr>
               </a:solidFill>
@@ -6007,110 +6054,73 @@
           <a:bodyPr/>
           <a:lstStyle/>
           <a:p>
-            <a:pPr>
-              <a:buClr>
-                <a:schemeClr val="accent5"/>
-              </a:buClr>
-            </a:pPr>
-            <a:r>
-              <a:rPr lang="pt-BR" smtClean="0"/>
-              <a:t>Apresentação</a:t>
-            </a:r>
-          </a:p>
-          <a:p>
-            <a:pPr>
-              <a:buClr>
-                <a:schemeClr val="accent5"/>
-              </a:buClr>
-            </a:pPr>
-            <a:r>
-              <a:rPr lang="pt-BR" smtClean="0"/>
-              <a:t>Objetivos do Curso</a:t>
-            </a:r>
-          </a:p>
-          <a:p>
-            <a:pPr>
-              <a:buClr>
-                <a:schemeClr val="accent5"/>
-              </a:buClr>
-            </a:pPr>
-            <a:r>
-              <a:rPr lang="pt-BR" smtClean="0"/>
-              <a:t>Metodologia de Ensino</a:t>
-            </a:r>
-          </a:p>
-          <a:p>
-            <a:pPr>
-              <a:buClr>
-                <a:schemeClr val="accent5"/>
-              </a:buClr>
-            </a:pPr>
-            <a:r>
-              <a:rPr lang="pt-BR" smtClean="0"/>
-              <a:t>Mercado de Trabalho</a:t>
-            </a:r>
-          </a:p>
-          <a:p>
-            <a:pPr lvl="1">
-              <a:buClr>
-                <a:schemeClr val="accent5"/>
-              </a:buClr>
-            </a:pPr>
-            <a:r>
-              <a:rPr lang="pt-BR" smtClean="0"/>
-              <a:t>(Des)Organização das Profissões de Tecnologia</a:t>
-            </a:r>
-          </a:p>
-          <a:p>
-            <a:pPr lvl="1">
-              <a:buClr>
-                <a:schemeClr val="accent5"/>
-              </a:buClr>
-            </a:pPr>
-            <a:r>
-              <a:rPr lang="pt-BR" smtClean="0"/>
+            <a:r>
+              <a:rPr lang="pt-BR" dirty="0"/>
+              <a:t>APRESENTAÇÃO</a:t>
+            </a:r>
+            <a:endParaRPr lang="pt-BR" dirty="0" smtClean="0"/>
+          </a:p>
+          <a:p>
+            <a:r>
+              <a:rPr lang="pt-BR" dirty="0"/>
+              <a:t>OBJETIVOS DO CURSO</a:t>
+            </a:r>
+          </a:p>
+          <a:p>
+            <a:r>
+              <a:rPr lang="pt-BR" dirty="0"/>
+              <a:t>METODOLOGIA DE ENSINO</a:t>
+            </a:r>
+          </a:p>
+          <a:p>
+            <a:r>
+              <a:rPr lang="pt-BR" dirty="0"/>
+              <a:t>MERCADO DE TRABALHO</a:t>
+            </a:r>
+          </a:p>
+          <a:p>
+            <a:pPr lvl="1"/>
+            <a:r>
+              <a:rPr lang="pt-BR" dirty="0"/>
+              <a:t>Realidade e Perspectiva do Mercado de </a:t>
+            </a:r>
+            <a:r>
+              <a:rPr lang="pt-BR" dirty="0" smtClean="0"/>
+              <a:t>Trabalho</a:t>
+            </a:r>
+          </a:p>
+          <a:p>
+            <a:pPr lvl="1"/>
+            <a:r>
+              <a:rPr lang="pt-BR" dirty="0" smtClean="0"/>
               <a:t>Oportunidades de Trabalho</a:t>
             </a:r>
           </a:p>
           <a:p>
-            <a:pPr>
-              <a:buClr>
-                <a:schemeClr val="accent5"/>
-              </a:buClr>
-            </a:pPr>
-            <a:r>
-              <a:rPr lang="pt-BR" smtClean="0"/>
-              <a:t>Carreira do Arquiteto de Sistemas/Programador</a:t>
-            </a:r>
-          </a:p>
-          <a:p>
-            <a:pPr lvl="1">
-              <a:buClr>
-                <a:schemeClr val="accent5"/>
-              </a:buClr>
-            </a:pPr>
-            <a:r>
-              <a:rPr lang="pt-BR" smtClean="0"/>
-              <a:t>Dificuldades e Desafios</a:t>
-            </a:r>
-          </a:p>
-          <a:p>
-            <a:pPr lvl="1">
-              <a:buClr>
-                <a:schemeClr val="accent5"/>
-              </a:buClr>
-            </a:pPr>
-            <a:r>
-              <a:rPr lang="pt-BR" smtClean="0"/>
-              <a:t>Networking Realmente “Existe”</a:t>
-            </a:r>
-          </a:p>
-          <a:p>
-            <a:pPr>
-              <a:buClr>
-                <a:schemeClr val="accent5"/>
-              </a:buClr>
-            </a:pPr>
+            <a:r>
+              <a:rPr lang="pt-BR" dirty="0" smtClean="0"/>
+              <a:t>CARREIRA</a:t>
+            </a:r>
+          </a:p>
+          <a:p>
+            <a:pPr lvl="1"/>
+            <a:r>
+              <a:rPr lang="pt-BR" dirty="0"/>
+              <a:t>No </a:t>
+            </a:r>
+            <a:r>
+              <a:rPr lang="pt-BR" dirty="0" smtClean="0"/>
+              <a:t>Brasil</a:t>
+            </a:r>
+          </a:p>
+          <a:p>
+            <a:pPr lvl="1"/>
+            <a:r>
+              <a:rPr lang="pt-BR" dirty="0"/>
+              <a:t>No Exterior, visão Global</a:t>
+            </a:r>
+          </a:p>
+          <a:p>
             <a:endParaRPr lang="pt-BR" dirty="0"/>
           </a:p>
         </p:txBody>
@@ -6118,7 +6128,1129 @@
     </p:spTree>
     <p:extLst>
       <p:ext uri="{BB962C8B-B14F-4D97-AF65-F5344CB8AC3E}">
-        <p14:creationId xmlns:p14="http://schemas.microsoft.com/office/powerpoint/2010/main" val="4013789392"/>
+        <p14:creationId xmlns:p14="http://schemas.microsoft.com/office/powerpoint/2010/main" val="3425094762"/>
+      </p:ext>
+    </p:extLst>
+  </p:cSld>
+  <p:clrMapOvr>
+    <a:masterClrMapping/>
+  </p:clrMapOvr>
+  <p:timing>
+    <p:tnLst>
+      <p:par>
+        <p:cTn id="1" dur="indefinite" restart="never" nodeType="tmRoot"/>
+      </p:par>
+    </p:tnLst>
+  </p:timing>
+</p:sld>
+</file>
+
+<file path=ppt/slides/slide11.xml><?xml version="1.0" encoding="utf-8"?>
+<p:sld xmlns:a="http://schemas.openxmlformats.org/drawingml/2006/main" xmlns:r="http://schemas.openxmlformats.org/officeDocument/2006/relationships" xmlns:p="http://schemas.openxmlformats.org/presentationml/2006/main">
+  <p:cSld>
+    <p:spTree>
+      <p:nvGrpSpPr>
+        <p:cNvPr id="1" name=""/>
+        <p:cNvGrpSpPr/>
+        <p:nvPr/>
+      </p:nvGrpSpPr>
+      <p:grpSpPr>
+        <a:xfrm>
+          <a:off x="0" y="0"/>
+          <a:ext cx="0" cy="0"/>
+          <a:chOff x="0" y="0"/>
+          <a:chExt cx="0" cy="0"/>
+        </a:xfrm>
+      </p:grpSpPr>
+      <p:sp>
+        <p:nvSpPr>
+          <p:cNvPr id="2" name="Título 1"/>
+          <p:cNvSpPr>
+            <a:spLocks noGrp="1"/>
+          </p:cNvSpPr>
+          <p:nvPr>
+            <p:ph type="title"/>
+          </p:nvPr>
+        </p:nvSpPr>
+        <p:spPr/>
+        <p:txBody>
+          <a:bodyPr/>
+          <a:lstStyle/>
+          <a:p>
+            <a:r>
+              <a:rPr lang="pt-BR" u="sng" dirty="0" smtClean="0">
+                <a:solidFill>
+                  <a:schemeClr val="accent5">
+                    <a:lumMod val="75000"/>
+                  </a:schemeClr>
+                </a:solidFill>
+              </a:rPr>
+              <a:t>Fundamentos e Objetivos do Teste</a:t>
+            </a:r>
+            <a:r>
+              <a:rPr lang="pt-BR" dirty="0">
+                <a:solidFill>
+                  <a:schemeClr val="accent5">
+                    <a:lumMod val="75000"/>
+                  </a:schemeClr>
+                </a:solidFill>
+              </a:rPr>
+              <a:t/>
+            </a:r>
+            <a:br>
+              <a:rPr lang="pt-BR" dirty="0">
+                <a:solidFill>
+                  <a:schemeClr val="accent5">
+                    <a:lumMod val="75000"/>
+                  </a:schemeClr>
+                </a:solidFill>
+              </a:rPr>
+            </a:br>
+            <a:r>
+              <a:rPr lang="pt-BR" dirty="0">
+                <a:solidFill>
+                  <a:schemeClr val="accent5">
+                    <a:lumMod val="75000"/>
+                  </a:schemeClr>
+                </a:solidFill>
+              </a:rPr>
+              <a:t>(Teste de Software)</a:t>
+            </a:r>
+          </a:p>
+        </p:txBody>
+      </p:sp>
+      <p:sp>
+        <p:nvSpPr>
+          <p:cNvPr id="3" name="Espaço Reservado para Conteúdo 2"/>
+          <p:cNvSpPr>
+            <a:spLocks noGrp="1"/>
+          </p:cNvSpPr>
+          <p:nvPr>
+            <p:ph idx="1"/>
+          </p:nvPr>
+        </p:nvSpPr>
+        <p:spPr/>
+        <p:txBody>
+          <a:bodyPr/>
+          <a:lstStyle/>
+          <a:p>
+            <a:r>
+              <a:rPr lang="pt-BR" dirty="0"/>
+              <a:t>Motivos</a:t>
+            </a:r>
+          </a:p>
+          <a:p>
+            <a:r>
+              <a:rPr lang="pt-BR" dirty="0" smtClean="0"/>
+              <a:t>O </a:t>
+            </a:r>
+            <a:r>
+              <a:rPr lang="pt-BR" dirty="0"/>
+              <a:t>dia-a-dia do Teste</a:t>
+            </a:r>
+          </a:p>
+          <a:p>
+            <a:r>
+              <a:rPr lang="pt-BR" dirty="0" smtClean="0"/>
+              <a:t>Alvos </a:t>
+            </a:r>
+            <a:r>
+              <a:rPr lang="pt-BR" dirty="0"/>
+              <a:t>de Teste (Overview)</a:t>
+            </a:r>
+          </a:p>
+          <a:p>
+            <a:r>
+              <a:rPr lang="pt-BR" dirty="0" smtClean="0"/>
+              <a:t>Qualidade</a:t>
+            </a:r>
+            <a:endParaRPr lang="pt-BR" dirty="0"/>
+          </a:p>
+          <a:p>
+            <a:r>
+              <a:rPr lang="pt-BR" dirty="0" smtClean="0"/>
+              <a:t>Etapas </a:t>
+            </a:r>
+            <a:r>
+              <a:rPr lang="pt-BR" dirty="0"/>
+              <a:t>do Teste</a:t>
+            </a:r>
+          </a:p>
+          <a:p>
+            <a:r>
+              <a:rPr lang="pt-BR" dirty="0" smtClean="0"/>
+              <a:t>Relacionamento </a:t>
+            </a:r>
+            <a:r>
+              <a:rPr lang="pt-BR" dirty="0"/>
+              <a:t>Profissional</a:t>
+            </a:r>
+          </a:p>
+        </p:txBody>
+      </p:sp>
+    </p:spTree>
+    <p:extLst>
+      <p:ext uri="{BB962C8B-B14F-4D97-AF65-F5344CB8AC3E}">
+        <p14:creationId xmlns:p14="http://schemas.microsoft.com/office/powerpoint/2010/main" val="1003120128"/>
+      </p:ext>
+    </p:extLst>
+  </p:cSld>
+  <p:clrMapOvr>
+    <a:masterClrMapping/>
+  </p:clrMapOvr>
+  <p:timing>
+    <p:tnLst>
+      <p:par>
+        <p:cTn id="1" dur="indefinite" restart="never" nodeType="tmRoot"/>
+      </p:par>
+    </p:tnLst>
+  </p:timing>
+</p:sld>
+</file>
+
+<file path=ppt/slides/slide12.xml><?xml version="1.0" encoding="utf-8"?>
+<p:sld xmlns:a="http://schemas.openxmlformats.org/drawingml/2006/main" xmlns:r="http://schemas.openxmlformats.org/officeDocument/2006/relationships" xmlns:p="http://schemas.openxmlformats.org/presentationml/2006/main">
+  <p:cSld>
+    <p:spTree>
+      <p:nvGrpSpPr>
+        <p:cNvPr id="1" name=""/>
+        <p:cNvGrpSpPr/>
+        <p:nvPr/>
+      </p:nvGrpSpPr>
+      <p:grpSpPr>
+        <a:xfrm>
+          <a:off x="0" y="0"/>
+          <a:ext cx="0" cy="0"/>
+          <a:chOff x="0" y="0"/>
+          <a:chExt cx="0" cy="0"/>
+        </a:xfrm>
+      </p:grpSpPr>
+      <p:sp>
+        <p:nvSpPr>
+          <p:cNvPr id="2" name="Título 1"/>
+          <p:cNvSpPr>
+            <a:spLocks noGrp="1"/>
+          </p:cNvSpPr>
+          <p:nvPr>
+            <p:ph type="title"/>
+          </p:nvPr>
+        </p:nvSpPr>
+        <p:spPr/>
+        <p:txBody>
+          <a:bodyPr/>
+          <a:lstStyle/>
+          <a:p>
+            <a:r>
+              <a:rPr lang="pt-BR" u="sng" dirty="0" smtClean="0">
+                <a:solidFill>
+                  <a:schemeClr val="accent5">
+                    <a:lumMod val="75000"/>
+                  </a:schemeClr>
+                </a:solidFill>
+              </a:rPr>
+              <a:t>Teste e o Ciclo de Vida do Software</a:t>
+            </a:r>
+            <a:r>
+              <a:rPr lang="pt-BR" dirty="0">
+                <a:solidFill>
+                  <a:schemeClr val="accent5">
+                    <a:lumMod val="75000"/>
+                  </a:schemeClr>
+                </a:solidFill>
+              </a:rPr>
+              <a:t/>
+            </a:r>
+            <a:br>
+              <a:rPr lang="pt-BR" dirty="0">
+                <a:solidFill>
+                  <a:schemeClr val="accent5">
+                    <a:lumMod val="75000"/>
+                  </a:schemeClr>
+                </a:solidFill>
+              </a:rPr>
+            </a:br>
+            <a:r>
+              <a:rPr lang="pt-BR" dirty="0">
+                <a:solidFill>
+                  <a:schemeClr val="accent5">
+                    <a:lumMod val="75000"/>
+                  </a:schemeClr>
+                </a:solidFill>
+              </a:rPr>
+              <a:t>(Teste de Software)</a:t>
+            </a:r>
+          </a:p>
+        </p:txBody>
+      </p:sp>
+      <p:sp>
+        <p:nvSpPr>
+          <p:cNvPr id="3" name="Espaço Reservado para Conteúdo 2"/>
+          <p:cNvSpPr>
+            <a:spLocks noGrp="1"/>
+          </p:cNvSpPr>
+          <p:nvPr>
+            <p:ph idx="1"/>
+          </p:nvPr>
+        </p:nvSpPr>
+        <p:spPr/>
+        <p:txBody>
+          <a:bodyPr/>
+          <a:lstStyle/>
+          <a:p>
+            <a:r>
+              <a:rPr lang="pt-BR" dirty="0"/>
+              <a:t>Modelos de Desenvolvimento de Software</a:t>
+            </a:r>
+          </a:p>
+          <a:p>
+            <a:r>
+              <a:rPr lang="pt-BR" dirty="0" smtClean="0"/>
+              <a:t>Fases</a:t>
+            </a:r>
+            <a:r>
+              <a:rPr lang="pt-BR" dirty="0"/>
+              <a:t>, Tipos e Papéis de Teste</a:t>
+            </a:r>
+          </a:p>
+        </p:txBody>
+      </p:sp>
+    </p:spTree>
+    <p:extLst>
+      <p:ext uri="{BB962C8B-B14F-4D97-AF65-F5344CB8AC3E}">
+        <p14:creationId xmlns:p14="http://schemas.microsoft.com/office/powerpoint/2010/main" val="3481741263"/>
+      </p:ext>
+    </p:extLst>
+  </p:cSld>
+  <p:clrMapOvr>
+    <a:masterClrMapping/>
+  </p:clrMapOvr>
+  <p:timing>
+    <p:tnLst>
+      <p:par>
+        <p:cTn id="1" dur="indefinite" restart="never" nodeType="tmRoot"/>
+      </p:par>
+    </p:tnLst>
+  </p:timing>
+</p:sld>
+</file>
+
+<file path=ppt/slides/slide13.xml><?xml version="1.0" encoding="utf-8"?>
+<p:sld xmlns:a="http://schemas.openxmlformats.org/drawingml/2006/main" xmlns:r="http://schemas.openxmlformats.org/officeDocument/2006/relationships" xmlns:p="http://schemas.openxmlformats.org/presentationml/2006/main">
+  <p:cSld>
+    <p:spTree>
+      <p:nvGrpSpPr>
+        <p:cNvPr id="1" name=""/>
+        <p:cNvGrpSpPr/>
+        <p:nvPr/>
+      </p:nvGrpSpPr>
+      <p:grpSpPr>
+        <a:xfrm>
+          <a:off x="0" y="0"/>
+          <a:ext cx="0" cy="0"/>
+          <a:chOff x="0" y="0"/>
+          <a:chExt cx="0" cy="0"/>
+        </a:xfrm>
+      </p:grpSpPr>
+      <p:sp>
+        <p:nvSpPr>
+          <p:cNvPr id="2" name="Título 1"/>
+          <p:cNvSpPr>
+            <a:spLocks noGrp="1"/>
+          </p:cNvSpPr>
+          <p:nvPr>
+            <p:ph type="title"/>
+          </p:nvPr>
+        </p:nvSpPr>
+        <p:spPr/>
+        <p:txBody>
+          <a:bodyPr/>
+          <a:lstStyle/>
+          <a:p>
+            <a:r>
+              <a:rPr lang="pt-BR" u="sng" dirty="0" smtClean="0">
+                <a:solidFill>
+                  <a:schemeClr val="accent5">
+                    <a:lumMod val="75000"/>
+                  </a:schemeClr>
+                </a:solidFill>
+              </a:rPr>
+              <a:t>Preparação e Execução dos Testes</a:t>
+            </a:r>
+            <a:r>
+              <a:rPr lang="pt-BR" dirty="0">
+                <a:solidFill>
+                  <a:schemeClr val="accent5">
+                    <a:lumMod val="75000"/>
+                  </a:schemeClr>
+                </a:solidFill>
+              </a:rPr>
+              <a:t/>
+            </a:r>
+            <a:br>
+              <a:rPr lang="pt-BR" dirty="0">
+                <a:solidFill>
+                  <a:schemeClr val="accent5">
+                    <a:lumMod val="75000"/>
+                  </a:schemeClr>
+                </a:solidFill>
+              </a:rPr>
+            </a:br>
+            <a:r>
+              <a:rPr lang="pt-BR" dirty="0">
+                <a:solidFill>
+                  <a:schemeClr val="accent5">
+                    <a:lumMod val="75000"/>
+                  </a:schemeClr>
+                </a:solidFill>
+              </a:rPr>
+              <a:t>(Teste de Software)</a:t>
+            </a:r>
+          </a:p>
+        </p:txBody>
+      </p:sp>
+      <p:sp>
+        <p:nvSpPr>
+          <p:cNvPr id="3" name="Espaço Reservado para Conteúdo 2"/>
+          <p:cNvSpPr>
+            <a:spLocks noGrp="1"/>
+          </p:cNvSpPr>
+          <p:nvPr>
+            <p:ph idx="1"/>
+          </p:nvPr>
+        </p:nvSpPr>
+        <p:spPr/>
+        <p:txBody>
+          <a:bodyPr/>
+          <a:lstStyle/>
+          <a:p>
+            <a:r>
+              <a:rPr lang="pt-BR" dirty="0" smtClean="0"/>
+              <a:t>Testes </a:t>
+            </a:r>
+            <a:r>
+              <a:rPr lang="pt-BR" dirty="0"/>
+              <a:t>de Artefatos Estáticos</a:t>
+            </a:r>
+          </a:p>
+          <a:p>
+            <a:r>
+              <a:rPr lang="pt-BR" dirty="0" smtClean="0"/>
+              <a:t>Caixa-Preta </a:t>
+            </a:r>
+            <a:r>
+              <a:rPr lang="pt-BR" dirty="0"/>
+              <a:t>e Caixa-Branca</a:t>
+            </a:r>
+          </a:p>
+          <a:p>
+            <a:r>
+              <a:rPr lang="pt-BR" dirty="0" smtClean="0"/>
+              <a:t>O </a:t>
+            </a:r>
+            <a:r>
+              <a:rPr lang="pt-BR" dirty="0"/>
+              <a:t>Caso de Teste</a:t>
+            </a:r>
+          </a:p>
+          <a:p>
+            <a:pPr lvl="1"/>
+            <a:r>
+              <a:rPr lang="pt-BR" dirty="0" smtClean="0"/>
+              <a:t>Objetivos</a:t>
+            </a:r>
+          </a:p>
+          <a:p>
+            <a:pPr lvl="1"/>
+            <a:r>
+              <a:rPr lang="pt-BR" dirty="0" smtClean="0"/>
+              <a:t>Precondições</a:t>
+            </a:r>
+          </a:p>
+          <a:p>
+            <a:pPr lvl="1"/>
+            <a:r>
+              <a:rPr lang="pt-BR" dirty="0" smtClean="0"/>
+              <a:t>Passos e Resultados</a:t>
+            </a:r>
+            <a:endParaRPr lang="pt-BR" dirty="0"/>
+          </a:p>
+          <a:p>
+            <a:r>
+              <a:rPr lang="pt-BR" dirty="0" smtClean="0"/>
+              <a:t>Testes </a:t>
+            </a:r>
+            <a:r>
+              <a:rPr lang="pt-BR" dirty="0"/>
+              <a:t>Exploratórios</a:t>
+            </a:r>
+          </a:p>
+          <a:p>
+            <a:r>
+              <a:rPr lang="pt-BR" dirty="0" smtClean="0"/>
+              <a:t>Abordagens </a:t>
+            </a:r>
+            <a:r>
+              <a:rPr lang="pt-BR" dirty="0"/>
+              <a:t>e Estratégias de Teste</a:t>
+            </a:r>
+          </a:p>
+        </p:txBody>
+      </p:sp>
+    </p:spTree>
+    <p:extLst>
+      <p:ext uri="{BB962C8B-B14F-4D97-AF65-F5344CB8AC3E}">
+        <p14:creationId xmlns:p14="http://schemas.microsoft.com/office/powerpoint/2010/main" val="3394589203"/>
+      </p:ext>
+    </p:extLst>
+  </p:cSld>
+  <p:clrMapOvr>
+    <a:masterClrMapping/>
+  </p:clrMapOvr>
+  <p:timing>
+    <p:tnLst>
+      <p:par>
+        <p:cTn id="1" dur="indefinite" restart="never" nodeType="tmRoot"/>
+      </p:par>
+    </p:tnLst>
+  </p:timing>
+</p:sld>
+</file>
+
+<file path=ppt/slides/slide14.xml><?xml version="1.0" encoding="utf-8"?>
+<p:sld xmlns:a="http://schemas.openxmlformats.org/drawingml/2006/main" xmlns:r="http://schemas.openxmlformats.org/officeDocument/2006/relationships" xmlns:p="http://schemas.openxmlformats.org/presentationml/2006/main">
+  <p:cSld>
+    <p:spTree>
+      <p:nvGrpSpPr>
+        <p:cNvPr id="1" name=""/>
+        <p:cNvGrpSpPr/>
+        <p:nvPr/>
+      </p:nvGrpSpPr>
+      <p:grpSpPr>
+        <a:xfrm>
+          <a:off x="0" y="0"/>
+          <a:ext cx="0" cy="0"/>
+          <a:chOff x="0" y="0"/>
+          <a:chExt cx="0" cy="0"/>
+        </a:xfrm>
+      </p:grpSpPr>
+      <p:sp>
+        <p:nvSpPr>
+          <p:cNvPr id="2" name="Título 1"/>
+          <p:cNvSpPr>
+            <a:spLocks noGrp="1"/>
+          </p:cNvSpPr>
+          <p:nvPr>
+            <p:ph type="title"/>
+          </p:nvPr>
+        </p:nvSpPr>
+        <p:spPr/>
+        <p:txBody>
+          <a:bodyPr/>
+          <a:lstStyle/>
+          <a:p>
+            <a:r>
+              <a:rPr lang="pt-BR" u="sng" dirty="0" smtClean="0">
+                <a:solidFill>
+                  <a:schemeClr val="accent5">
+                    <a:lumMod val="75000"/>
+                  </a:schemeClr>
+                </a:solidFill>
+              </a:rPr>
+              <a:t>Gerenciamento dos Testes</a:t>
+            </a:r>
+            <a:r>
+              <a:rPr lang="pt-BR" dirty="0">
+                <a:solidFill>
+                  <a:schemeClr val="accent5">
+                    <a:lumMod val="75000"/>
+                  </a:schemeClr>
+                </a:solidFill>
+              </a:rPr>
+              <a:t/>
+            </a:r>
+            <a:br>
+              <a:rPr lang="pt-BR" dirty="0">
+                <a:solidFill>
+                  <a:schemeClr val="accent5">
+                    <a:lumMod val="75000"/>
+                  </a:schemeClr>
+                </a:solidFill>
+              </a:rPr>
+            </a:br>
+            <a:r>
+              <a:rPr lang="pt-BR" dirty="0">
+                <a:solidFill>
+                  <a:schemeClr val="accent5">
+                    <a:lumMod val="75000"/>
+                  </a:schemeClr>
+                </a:solidFill>
+              </a:rPr>
+              <a:t>(Teste de Software)</a:t>
+            </a:r>
+          </a:p>
+        </p:txBody>
+      </p:sp>
+      <p:sp>
+        <p:nvSpPr>
+          <p:cNvPr id="3" name="Espaço Reservado para Conteúdo 2"/>
+          <p:cNvSpPr>
+            <a:spLocks noGrp="1"/>
+          </p:cNvSpPr>
+          <p:nvPr>
+            <p:ph idx="1"/>
+          </p:nvPr>
+        </p:nvSpPr>
+        <p:spPr/>
+        <p:txBody>
+          <a:bodyPr/>
+          <a:lstStyle/>
+          <a:p>
+            <a:r>
+              <a:rPr lang="pt-BR" dirty="0" smtClean="0"/>
+              <a:t>Organização </a:t>
+            </a:r>
+            <a:r>
+              <a:rPr lang="pt-BR" dirty="0"/>
+              <a:t>do Teste</a:t>
+            </a:r>
+          </a:p>
+          <a:p>
+            <a:r>
+              <a:rPr lang="pt-BR" dirty="0" smtClean="0"/>
+              <a:t>Estimativa </a:t>
+            </a:r>
+            <a:r>
+              <a:rPr lang="pt-BR" dirty="0"/>
+              <a:t>do Testes</a:t>
+            </a:r>
+          </a:p>
+          <a:p>
+            <a:r>
+              <a:rPr lang="pt-BR" dirty="0" smtClean="0"/>
+              <a:t>Controle </a:t>
+            </a:r>
+            <a:r>
+              <a:rPr lang="pt-BR" dirty="0"/>
+              <a:t>e Monitoração do Progresso do Teste</a:t>
+            </a:r>
+          </a:p>
+          <a:p>
+            <a:r>
+              <a:rPr lang="pt-BR" dirty="0" smtClean="0"/>
+              <a:t>Gestão </a:t>
+            </a:r>
+            <a:r>
+              <a:rPr lang="pt-BR" dirty="0"/>
+              <a:t>de Configuração</a:t>
+            </a:r>
+          </a:p>
+          <a:p>
+            <a:r>
+              <a:rPr lang="pt-BR" dirty="0" smtClean="0"/>
+              <a:t>Riscos </a:t>
+            </a:r>
+            <a:r>
+              <a:rPr lang="pt-BR" dirty="0"/>
+              <a:t>e Teste, Projetos e Produtos</a:t>
+            </a:r>
+          </a:p>
+          <a:p>
+            <a:r>
+              <a:rPr lang="pt-BR" dirty="0" smtClean="0"/>
+              <a:t>Gestão </a:t>
+            </a:r>
+            <a:r>
+              <a:rPr lang="pt-BR" dirty="0"/>
+              <a:t>de Incidentes</a:t>
+            </a:r>
+          </a:p>
+        </p:txBody>
+      </p:sp>
+    </p:spTree>
+    <p:extLst>
+      <p:ext uri="{BB962C8B-B14F-4D97-AF65-F5344CB8AC3E}">
+        <p14:creationId xmlns:p14="http://schemas.microsoft.com/office/powerpoint/2010/main" val="294112267"/>
+      </p:ext>
+    </p:extLst>
+  </p:cSld>
+  <p:clrMapOvr>
+    <a:masterClrMapping/>
+  </p:clrMapOvr>
+  <p:timing>
+    <p:tnLst>
+      <p:par>
+        <p:cTn id="1" dur="indefinite" restart="never" nodeType="tmRoot"/>
+      </p:par>
+    </p:tnLst>
+  </p:timing>
+</p:sld>
+</file>
+
+<file path=ppt/slides/slide15.xml><?xml version="1.0" encoding="utf-8"?>
+<p:sld xmlns:a="http://schemas.openxmlformats.org/drawingml/2006/main" xmlns:r="http://schemas.openxmlformats.org/officeDocument/2006/relationships" xmlns:p="http://schemas.openxmlformats.org/presentationml/2006/main">
+  <p:cSld>
+    <p:spTree>
+      <p:nvGrpSpPr>
+        <p:cNvPr id="1" name=""/>
+        <p:cNvGrpSpPr/>
+        <p:nvPr/>
+      </p:nvGrpSpPr>
+      <p:grpSpPr>
+        <a:xfrm>
+          <a:off x="0" y="0"/>
+          <a:ext cx="0" cy="0"/>
+          <a:chOff x="0" y="0"/>
+          <a:chExt cx="0" cy="0"/>
+        </a:xfrm>
+      </p:grpSpPr>
+      <p:sp>
+        <p:nvSpPr>
+          <p:cNvPr id="2" name="Título 1"/>
+          <p:cNvSpPr>
+            <a:spLocks noGrp="1"/>
+          </p:cNvSpPr>
+          <p:nvPr>
+            <p:ph type="title"/>
+          </p:nvPr>
+        </p:nvSpPr>
+        <p:spPr/>
+        <p:txBody>
+          <a:bodyPr/>
+          <a:lstStyle/>
+          <a:p>
+            <a:r>
+              <a:rPr lang="pt-BR" u="sng" dirty="0" smtClean="0">
+                <a:solidFill>
+                  <a:schemeClr val="accent5">
+                    <a:lumMod val="75000"/>
+                  </a:schemeClr>
+                </a:solidFill>
+              </a:rPr>
+              <a:t>Ferramentas de Testes</a:t>
+            </a:r>
+            <a:r>
+              <a:rPr lang="pt-BR" dirty="0">
+                <a:solidFill>
+                  <a:schemeClr val="accent5">
+                    <a:lumMod val="75000"/>
+                  </a:schemeClr>
+                </a:solidFill>
+              </a:rPr>
+              <a:t/>
+            </a:r>
+            <a:br>
+              <a:rPr lang="pt-BR" dirty="0">
+                <a:solidFill>
+                  <a:schemeClr val="accent5">
+                    <a:lumMod val="75000"/>
+                  </a:schemeClr>
+                </a:solidFill>
+              </a:rPr>
+            </a:br>
+            <a:r>
+              <a:rPr lang="pt-BR" dirty="0">
+                <a:solidFill>
+                  <a:schemeClr val="accent5">
+                    <a:lumMod val="75000"/>
+                  </a:schemeClr>
+                </a:solidFill>
+              </a:rPr>
+              <a:t>(Teste de Software)</a:t>
+            </a:r>
+          </a:p>
+        </p:txBody>
+      </p:sp>
+      <p:sp>
+        <p:nvSpPr>
+          <p:cNvPr id="3" name="Espaço Reservado para Conteúdo 2"/>
+          <p:cNvSpPr>
+            <a:spLocks noGrp="1"/>
+          </p:cNvSpPr>
+          <p:nvPr>
+            <p:ph idx="1"/>
+          </p:nvPr>
+        </p:nvSpPr>
+        <p:spPr/>
+        <p:txBody>
+          <a:bodyPr/>
+          <a:lstStyle/>
+          <a:p>
+            <a:r>
+              <a:rPr lang="pt-BR" dirty="0" smtClean="0"/>
+              <a:t>Ferramentas na Prática de Testes</a:t>
+            </a:r>
+          </a:p>
+          <a:p>
+            <a:pPr lvl="1"/>
+            <a:r>
+              <a:rPr lang="pt-BR" dirty="0" smtClean="0"/>
+              <a:t>Organização</a:t>
+            </a:r>
+          </a:p>
+          <a:p>
+            <a:pPr lvl="1"/>
+            <a:r>
+              <a:rPr lang="pt-BR" dirty="0" smtClean="0"/>
+              <a:t>Gerenciamento e Controle</a:t>
+            </a:r>
+          </a:p>
+          <a:p>
+            <a:pPr lvl="1"/>
+            <a:r>
+              <a:rPr lang="pt-BR" dirty="0" smtClean="0"/>
+              <a:t>Execução</a:t>
+            </a:r>
+          </a:p>
+          <a:p>
+            <a:pPr lvl="1"/>
+            <a:r>
+              <a:rPr lang="pt-BR" dirty="0" smtClean="0"/>
+              <a:t>Incidentes</a:t>
+            </a:r>
+          </a:p>
+          <a:p>
+            <a:pPr lvl="1"/>
+            <a:r>
+              <a:rPr lang="pt-BR" dirty="0" smtClean="0"/>
+              <a:t>Performance, Stress e </a:t>
+            </a:r>
+          </a:p>
+          <a:p>
+            <a:pPr lvl="1"/>
+            <a:r>
+              <a:rPr lang="pt-BR" dirty="0" smtClean="0"/>
+              <a:t>Automatização</a:t>
+            </a:r>
+          </a:p>
+        </p:txBody>
+      </p:sp>
+    </p:spTree>
+    <p:extLst>
+      <p:ext uri="{BB962C8B-B14F-4D97-AF65-F5344CB8AC3E}">
+        <p14:creationId xmlns:p14="http://schemas.microsoft.com/office/powerpoint/2010/main" val="3346477383"/>
+      </p:ext>
+    </p:extLst>
+  </p:cSld>
+  <p:clrMapOvr>
+    <a:masterClrMapping/>
+  </p:clrMapOvr>
+  <p:timing>
+    <p:tnLst>
+      <p:par>
+        <p:cTn id="1" dur="indefinite" restart="never" nodeType="tmRoot"/>
+      </p:par>
+    </p:tnLst>
+  </p:timing>
+</p:sld>
+</file>
+
+<file path=ppt/slides/slide16.xml><?xml version="1.0" encoding="utf-8"?>
+<p:sld xmlns:a="http://schemas.openxmlformats.org/drawingml/2006/main" xmlns:r="http://schemas.openxmlformats.org/officeDocument/2006/relationships" xmlns:p="http://schemas.openxmlformats.org/presentationml/2006/main">
+  <p:cSld>
+    <p:spTree>
+      <p:nvGrpSpPr>
+        <p:cNvPr id="1" name=""/>
+        <p:cNvGrpSpPr/>
+        <p:nvPr/>
+      </p:nvGrpSpPr>
+      <p:grpSpPr>
+        <a:xfrm>
+          <a:off x="0" y="0"/>
+          <a:ext cx="0" cy="0"/>
+          <a:chOff x="0" y="0"/>
+          <a:chExt cx="0" cy="0"/>
+        </a:xfrm>
+      </p:grpSpPr>
+      <p:sp>
+        <p:nvSpPr>
+          <p:cNvPr id="2" name="Título 1"/>
+          <p:cNvSpPr>
+            <a:spLocks noGrp="1"/>
+          </p:cNvSpPr>
+          <p:nvPr>
+            <p:ph type="title"/>
+          </p:nvPr>
+        </p:nvSpPr>
+        <p:spPr/>
+        <p:txBody>
+          <a:bodyPr/>
+          <a:lstStyle/>
+          <a:p>
+            <a:r>
+              <a:rPr lang="pt-BR" u="sng" dirty="0" smtClean="0">
+                <a:solidFill>
+                  <a:schemeClr val="accent5">
+                    <a:lumMod val="75000"/>
+                  </a:schemeClr>
+                </a:solidFill>
+              </a:rPr>
+              <a:t>Extra – Testes Ágeis</a:t>
+            </a:r>
+            <a:r>
+              <a:rPr lang="pt-BR" dirty="0">
+                <a:solidFill>
+                  <a:schemeClr val="accent5">
+                    <a:lumMod val="75000"/>
+                  </a:schemeClr>
+                </a:solidFill>
+              </a:rPr>
+              <a:t/>
+            </a:r>
+            <a:br>
+              <a:rPr lang="pt-BR" dirty="0">
+                <a:solidFill>
+                  <a:schemeClr val="accent5">
+                    <a:lumMod val="75000"/>
+                  </a:schemeClr>
+                </a:solidFill>
+              </a:rPr>
+            </a:br>
+            <a:r>
+              <a:rPr lang="pt-BR" dirty="0">
+                <a:solidFill>
+                  <a:schemeClr val="accent5">
+                    <a:lumMod val="75000"/>
+                  </a:schemeClr>
+                </a:solidFill>
+              </a:rPr>
+              <a:t>(Teste de Software)</a:t>
+            </a:r>
+          </a:p>
+        </p:txBody>
+      </p:sp>
+      <p:sp>
+        <p:nvSpPr>
+          <p:cNvPr id="3" name="Espaço Reservado para Conteúdo 2"/>
+          <p:cNvSpPr>
+            <a:spLocks noGrp="1"/>
+          </p:cNvSpPr>
+          <p:nvPr>
+            <p:ph idx="1"/>
+          </p:nvPr>
+        </p:nvSpPr>
+        <p:spPr/>
+        <p:txBody>
+          <a:bodyPr/>
+          <a:lstStyle/>
+          <a:p>
+            <a:r>
+              <a:rPr lang="pt-BR" dirty="0" smtClean="0"/>
+              <a:t>O Desenvolvimento Ágil</a:t>
+            </a:r>
+          </a:p>
+          <a:p>
+            <a:r>
+              <a:rPr lang="pt-BR" dirty="0" smtClean="0"/>
+              <a:t>O Teste Prescritivo vs. Teste Ágeis</a:t>
+            </a:r>
+          </a:p>
+          <a:p>
+            <a:r>
+              <a:rPr lang="pt-BR" smtClean="0"/>
+              <a:t>Prática</a:t>
+            </a:r>
+            <a:endParaRPr lang="pt-BR" dirty="0" smtClean="0"/>
+          </a:p>
+          <a:p>
+            <a:endParaRPr lang="pt-BR" dirty="0" smtClean="0"/>
+          </a:p>
+          <a:p>
+            <a:endParaRPr lang="pt-BR" dirty="0" smtClean="0"/>
+          </a:p>
+        </p:txBody>
+      </p:sp>
+    </p:spTree>
+    <p:extLst>
+      <p:ext uri="{BB962C8B-B14F-4D97-AF65-F5344CB8AC3E}">
+        <p14:creationId xmlns:p14="http://schemas.microsoft.com/office/powerpoint/2010/main" val="1316536372"/>
+      </p:ext>
+    </p:extLst>
+  </p:cSld>
+  <p:clrMapOvr>
+    <a:masterClrMapping/>
+  </p:clrMapOvr>
+  <p:timing>
+    <p:tnLst>
+      <p:par>
+        <p:cTn id="1" dur="indefinite" restart="never" nodeType="tmRoot"/>
+      </p:par>
+    </p:tnLst>
+  </p:timing>
+</p:sld>
+</file>
+
+<file path=ppt/slides/slide17.xml><?xml version="1.0" encoding="utf-8"?>
+<p:sld xmlns:a="http://schemas.openxmlformats.org/drawingml/2006/main" xmlns:r="http://schemas.openxmlformats.org/officeDocument/2006/relationships" xmlns:p="http://schemas.openxmlformats.org/presentationml/2006/main">
+  <p:cSld>
+    <p:spTree>
+      <p:nvGrpSpPr>
+        <p:cNvPr id="1" name=""/>
+        <p:cNvGrpSpPr/>
+        <p:nvPr/>
+      </p:nvGrpSpPr>
+      <p:grpSpPr>
+        <a:xfrm>
+          <a:off x="0" y="0"/>
+          <a:ext cx="0" cy="0"/>
+          <a:chOff x="0" y="0"/>
+          <a:chExt cx="0" cy="0"/>
+        </a:xfrm>
+      </p:grpSpPr>
+      <p:sp>
+        <p:nvSpPr>
+          <p:cNvPr id="2" name="Título 1"/>
+          <p:cNvSpPr>
+            <a:spLocks noGrp="1"/>
+          </p:cNvSpPr>
+          <p:nvPr>
+            <p:ph type="title"/>
+          </p:nvPr>
+        </p:nvSpPr>
+        <p:spPr/>
+        <p:txBody>
+          <a:bodyPr/>
+          <a:lstStyle/>
+          <a:p>
+            <a:r>
+              <a:rPr lang="pt-BR" dirty="0" smtClean="0">
+                <a:solidFill>
+                  <a:srgbClr val="FF0000"/>
+                </a:solidFill>
+              </a:rPr>
+              <a:t>Análise de Requisitos</a:t>
+            </a:r>
+            <a:endParaRPr lang="pt-BR" dirty="0">
+              <a:solidFill>
+                <a:srgbClr val="FF0000"/>
+              </a:solidFill>
+            </a:endParaRPr>
+          </a:p>
+        </p:txBody>
+      </p:sp>
+      <p:sp>
+        <p:nvSpPr>
+          <p:cNvPr id="3" name="Espaço Reservado para Conteúdo 2"/>
+          <p:cNvSpPr>
+            <a:spLocks noGrp="1"/>
+          </p:cNvSpPr>
+          <p:nvPr>
+            <p:ph idx="1"/>
+          </p:nvPr>
+        </p:nvSpPr>
+        <p:spPr/>
+        <p:txBody>
+          <a:bodyPr/>
+          <a:lstStyle/>
+          <a:p>
+            <a:pPr>
+              <a:buFont typeface="+mj-lt"/>
+              <a:buAutoNum type="arabicPeriod"/>
+            </a:pPr>
+            <a:r>
+              <a:rPr lang="pt-BR" dirty="0" smtClean="0"/>
+              <a:t>Introdução </a:t>
+            </a:r>
+          </a:p>
+          <a:p>
+            <a:pPr>
+              <a:buFont typeface="+mj-lt"/>
+              <a:buAutoNum type="arabicPeriod"/>
+            </a:pPr>
+            <a:r>
+              <a:rPr lang="pt-BR" dirty="0" smtClean="0"/>
+              <a:t>Processo de Software</a:t>
+            </a:r>
+          </a:p>
+          <a:p>
+            <a:pPr>
+              <a:buFont typeface="+mj-lt"/>
+              <a:buAutoNum type="arabicPeriod"/>
+            </a:pPr>
+            <a:r>
+              <a:rPr lang="pt-BR" dirty="0" smtClean="0"/>
+              <a:t>Lógica e Algoritmos </a:t>
+            </a:r>
+            <a:endParaRPr lang="pt-BR" dirty="0" smtClean="0"/>
+          </a:p>
+          <a:p>
+            <a:pPr>
+              <a:buFont typeface="+mj-lt"/>
+              <a:buAutoNum type="arabicPeriod"/>
+            </a:pPr>
+            <a:r>
+              <a:rPr lang="pt-BR" dirty="0" smtClean="0"/>
+              <a:t>Configuração de Ambientes de Desenvolvimento</a:t>
+            </a:r>
+          </a:p>
+          <a:p>
+            <a:pPr>
+              <a:buFont typeface="+mj-lt"/>
+              <a:buAutoNum type="arabicPeriod"/>
+            </a:pPr>
+            <a:r>
+              <a:rPr lang="pt-BR" dirty="0" smtClean="0"/>
+              <a:t>Programação Orientada a Objetos</a:t>
+            </a:r>
+          </a:p>
+          <a:p>
+            <a:pPr>
+              <a:buFont typeface="+mj-lt"/>
+              <a:buAutoNum type="arabicPeriod"/>
+            </a:pPr>
+            <a:r>
+              <a:rPr lang="pt-BR" dirty="0"/>
+              <a:t>Banco de </a:t>
+            </a:r>
+            <a:r>
+              <a:rPr lang="pt-BR" dirty="0" smtClean="0"/>
+              <a:t>Dados</a:t>
+            </a:r>
+          </a:p>
+          <a:p>
+            <a:pPr>
+              <a:buFont typeface="+mj-lt"/>
+              <a:buAutoNum type="arabicPeriod"/>
+            </a:pPr>
+            <a:r>
+              <a:rPr lang="pt-BR"/>
+              <a:t>Testes </a:t>
+            </a:r>
+            <a:r>
+              <a:rPr lang="pt-BR"/>
+              <a:t>de </a:t>
+            </a:r>
+            <a:r>
+              <a:rPr lang="pt-BR" smtClean="0"/>
+              <a:t>Unidade</a:t>
+            </a:r>
+            <a:endParaRPr lang="pt-BR" dirty="0" smtClean="0"/>
+          </a:p>
+          <a:p>
+            <a:pPr>
+              <a:buFont typeface="+mj-lt"/>
+              <a:buAutoNum type="arabicPeriod"/>
+            </a:pPr>
+            <a:r>
+              <a:rPr lang="pt-BR" dirty="0" smtClean="0"/>
+              <a:t>Programação para Web</a:t>
+            </a:r>
+          </a:p>
+          <a:p>
+            <a:pPr>
+              <a:buFont typeface="+mj-lt"/>
+              <a:buAutoNum type="arabicPeriod"/>
+            </a:pPr>
+            <a:endParaRPr lang="pt-BR" dirty="0" smtClean="0"/>
+          </a:p>
+          <a:p>
+            <a:endParaRPr lang="pt-BR" dirty="0"/>
+          </a:p>
+        </p:txBody>
+      </p:sp>
+    </p:spTree>
+    <p:extLst>
+      <p:ext uri="{BB962C8B-B14F-4D97-AF65-F5344CB8AC3E}">
+        <p14:creationId xmlns:p14="http://schemas.microsoft.com/office/powerpoint/2010/main" val="2903023072"/>
       </p:ext>
     </p:extLst>
   </p:cSld>
@@ -7221,8 +8353,12 @@
           <a:lstStyle/>
           <a:p>
             <a:r>
-              <a:rPr lang="pt-BR" dirty="0" smtClean="0"/>
-              <a:t>Porque Gerenciar </a:t>
+              <a:rPr lang="pt-BR" smtClean="0"/>
+              <a:t>Porque </a:t>
+            </a:r>
+            <a:r>
+              <a:rPr lang="pt-BR" dirty="0" smtClean="0"/>
+              <a:t>Gerenciar </a:t>
             </a:r>
             <a:r>
               <a:rPr lang="pt-BR" dirty="0"/>
@@ -7317,18 +8453,18 @@
           <a:lstStyle/>
           <a:p>
             <a:r>
-              <a:rPr lang="pt-BR" dirty="0" smtClean="0">
-                <a:solidFill>
-                  <a:schemeClr val="accent6">
+              <a:rPr lang="pt-BR" u="sng" dirty="0" smtClean="0">
+                <a:solidFill>
+                  <a:schemeClr val="accent5">
                     <a:lumMod val="75000"/>
                   </a:schemeClr>
                 </a:solidFill>
               </a:rPr>
-              <a:t>Desenvolvimento de Sistemas</a:t>
-            </a:r>
-            <a:endParaRPr lang="pt-BR" dirty="0">
+              <a:t>Teste de Software</a:t>
+            </a:r>
+            <a:endParaRPr lang="pt-BR" u="sng" dirty="0">
               <a:solidFill>
-                <a:schemeClr val="accent6">
+                <a:schemeClr val="accent5">
                   <a:lumMod val="75000"/>
                 </a:schemeClr>
               </a:solidFill>
@@ -7352,109 +8488,12 @@
           <a:lstStyle/>
           <a:p>
             <a:pPr>
-              <a:buClr>
-                <a:schemeClr val="accent5"/>
-              </a:buClr>
               <a:buFont typeface="+mj-lt"/>
               <a:buAutoNum type="arabicPeriod"/>
             </a:pPr>
             <a:r>
-              <a:rPr lang="pt-BR" dirty="0" smtClean="0">
-                <a:solidFill>
-                  <a:schemeClr val="tx1"/>
-                </a:solidFill>
-              </a:rPr>
-              <a:t>Introdução </a:t>
-            </a:r>
-          </a:p>
-          <a:p>
-            <a:pPr>
-              <a:buClr>
-                <a:schemeClr val="accent5"/>
-              </a:buClr>
-              <a:buFont typeface="+mj-lt"/>
-              <a:buAutoNum type="arabicPeriod"/>
-            </a:pPr>
-            <a:r>
-              <a:rPr lang="pt-BR" dirty="0" smtClean="0">
-                <a:solidFill>
-                  <a:schemeClr val="tx1"/>
-                </a:solidFill>
-              </a:rPr>
-              <a:t>Processo de Software</a:t>
-            </a:r>
-          </a:p>
-          <a:p>
-            <a:pPr>
-              <a:buClr>
-                <a:schemeClr val="accent5"/>
-              </a:buClr>
-              <a:buFont typeface="+mj-lt"/>
-              <a:buAutoNum type="arabicPeriod"/>
-            </a:pPr>
-            <a:r>
-              <a:rPr lang="pt-BR" dirty="0" smtClean="0">
-                <a:solidFill>
-                  <a:schemeClr val="tx1"/>
-                </a:solidFill>
-              </a:rPr>
-              <a:t>Programação Orientada a Objetos</a:t>
-            </a:r>
-          </a:p>
-          <a:p>
-            <a:pPr>
-              <a:buClr>
-                <a:schemeClr val="accent5"/>
-              </a:buClr>
-              <a:buFont typeface="+mj-lt"/>
-              <a:buAutoNum type="arabicPeriod"/>
-            </a:pPr>
-            <a:r>
-              <a:rPr lang="pt-BR" dirty="0">
-                <a:solidFill>
-                  <a:schemeClr val="tx1"/>
-                </a:solidFill>
-              </a:rPr>
-              <a:t>Banco de Dados </a:t>
-            </a:r>
-            <a:endParaRPr lang="pt-BR" dirty="0" smtClean="0">
-              <a:solidFill>
-                <a:schemeClr val="tx1"/>
-              </a:solidFill>
-            </a:endParaRPr>
-          </a:p>
-          <a:p>
-            <a:pPr>
-              <a:buClr>
-                <a:schemeClr val="accent5"/>
-              </a:buClr>
-              <a:buFont typeface="+mj-lt"/>
-              <a:buAutoNum type="arabicPeriod"/>
-            </a:pPr>
-            <a:r>
-              <a:rPr lang="pt-BR" dirty="0" smtClean="0">
-                <a:solidFill>
-                  <a:schemeClr val="tx1"/>
-                </a:solidFill>
-              </a:rPr>
-              <a:t>Inter  </a:t>
-            </a:r>
-          </a:p>
-          <a:p>
-            <a:pPr>
-              <a:buClr>
-                <a:schemeClr val="accent5"/>
-              </a:buClr>
-              <a:buFont typeface="+mj-lt"/>
-              <a:buAutoNum type="arabicPeriod"/>
-            </a:pPr>
-            <a:r>
-              <a:rPr lang="pt-BR" dirty="0" smtClean="0">
-                <a:solidFill>
-                  <a:schemeClr val="tx1"/>
-                </a:solidFill>
-              </a:rPr>
-              <a:t>Gestão de Requisitos</a:t>
+              <a:rPr lang="pt-BR" dirty="0" smtClean="0"/>
+              <a:t>INTRODUÇÃO</a:t>
             </a:r>
           </a:p>
           <a:p>
@@ -7462,25 +8501,90 @@
               <a:buFont typeface="+mj-lt"/>
               <a:buAutoNum type="arabicPeriod"/>
             </a:pPr>
-            <a:endParaRPr lang="pt-BR" dirty="0" smtClean="0">
-              <a:solidFill>
-                <a:schemeClr val="tx1"/>
-              </a:solidFill>
-            </a:endParaRPr>
-          </a:p>
-          <a:p>
-            <a:endParaRPr lang="pt-BR" dirty="0">
-              <a:solidFill>
-                <a:schemeClr val="tx1"/>
-              </a:solidFill>
-            </a:endParaRPr>
+            <a:r>
+              <a:rPr lang="pt-BR" dirty="0"/>
+              <a:t>FUNDAMENTOS E OBJETIVOS DO </a:t>
+            </a:r>
+            <a:r>
+              <a:rPr lang="pt-BR" dirty="0" smtClean="0"/>
+              <a:t>TESTE</a:t>
+            </a:r>
+          </a:p>
+          <a:p>
+            <a:pPr>
+              <a:buFont typeface="+mj-lt"/>
+              <a:buAutoNum type="arabicPeriod"/>
+            </a:pPr>
+            <a:r>
+              <a:rPr lang="pt-BR" dirty="0"/>
+              <a:t>TESTE E O CICLO DE VIDA DO SOFTWARE</a:t>
+            </a:r>
+            <a:r>
+              <a:rPr lang="pt-BR" dirty="0" smtClean="0"/>
+              <a:t> </a:t>
+            </a:r>
+          </a:p>
+          <a:p>
+            <a:pPr>
+              <a:buFont typeface="+mj-lt"/>
+              <a:buAutoNum type="arabicPeriod"/>
+            </a:pPr>
+            <a:r>
+              <a:rPr lang="pt-BR" dirty="0"/>
+              <a:t>PREPARAÇÃO E EXECUÇÃO DOS </a:t>
+            </a:r>
+            <a:r>
+              <a:rPr lang="pt-BR" dirty="0" smtClean="0"/>
+              <a:t>TESTES</a:t>
+            </a:r>
+          </a:p>
+          <a:p>
+            <a:pPr>
+              <a:buFont typeface="+mj-lt"/>
+              <a:buAutoNum type="arabicPeriod"/>
+            </a:pPr>
+            <a:r>
+              <a:rPr lang="pt-BR" dirty="0"/>
+              <a:t>GERENCIAMENTO DE </a:t>
+            </a:r>
+            <a:r>
+              <a:rPr lang="pt-BR" dirty="0" smtClean="0"/>
+              <a:t>TESTE</a:t>
+            </a:r>
+          </a:p>
+          <a:p>
+            <a:pPr>
+              <a:buFont typeface="+mj-lt"/>
+              <a:buAutoNum type="arabicPeriod"/>
+            </a:pPr>
+            <a:r>
+              <a:rPr lang="pt-BR" dirty="0"/>
+              <a:t>FERRAMENTAS DE </a:t>
+            </a:r>
+            <a:r>
+              <a:rPr lang="pt-BR" dirty="0" smtClean="0"/>
+              <a:t>TESTE</a:t>
+            </a:r>
+          </a:p>
+          <a:p>
+            <a:pPr>
+              <a:buFont typeface="+mj-lt"/>
+              <a:buAutoNum type="arabicPeriod"/>
+            </a:pPr>
+            <a:r>
+              <a:rPr lang="pt-BR" dirty="0" smtClean="0"/>
+              <a:t>EXTRA – TESTES ÁGEIS</a:t>
+            </a:r>
+          </a:p>
+          <a:p>
+            <a:endParaRPr lang="pt-BR" dirty="0"/>
           </a:p>
         </p:txBody>
       </p:sp>
     </p:spTree>
     <p:extLst>
       <p:ext uri="{BB962C8B-B14F-4D97-AF65-F5344CB8AC3E}">
-        <p14:creationId xmlns:p14="http://schemas.microsoft.com/office/powerpoint/2010/main" val="3791561173"/>
+        <p14:creationId xmlns:p14="http://schemas.microsoft.com/office/powerpoint/2010/main" val="4104953059"/>
       </p:ext>
     </p:extLst>
   </p:cSld>

</xml_diff>